<commit_message>
lecture: 250422 - git 기초2
</commit_message>
<xml_diff>
--- a/material/03_Git 기초2.pptx
+++ b/material/03_Git 기초2.pptx
@@ -879,21 +879,20 @@
           <a:lstStyle/>
           <a:p>
             <a:r>
-              <a:rPr lang="en-US" altLang="ko-KR" dirty="0" smtClean="0"/>
+              <a:rPr lang="en-US" altLang="ko-KR" dirty="0"/>
               <a:t>-notion </a:t>
             </a:r>
             <a:r>
-              <a:rPr lang="ko-KR" altLang="en-US" dirty="0" smtClean="0"/>
+              <a:rPr lang="ko-KR" altLang="en-US" dirty="0"/>
               <a:t>보기</a:t>
             </a:r>
-            <a:endParaRPr lang="en-US" altLang="ko-KR" dirty="0" smtClean="0"/>
-          </a:p>
-          <a:p>
-            <a:r>
-              <a:rPr lang="en-US" altLang="ko-KR" dirty="0" smtClean="0"/>
+            <a:endParaRPr lang="en-US" altLang="ko-KR" dirty="0"/>
+          </a:p>
+          <a:p>
+            <a:r>
+              <a:rPr lang="en-US" altLang="ko-KR" dirty="0"/>
               <a:t>https://www.notion.so/1dcd6fe891f2808897ade090db37ca77</a:t>
             </a:r>
-            <a:endParaRPr lang="en-US" altLang="ko-KR" dirty="0"/>
           </a:p>
         </p:txBody>
       </p:sp>
@@ -1233,127 +1232,127 @@
           <a:lstStyle/>
           <a:p>
             <a:r>
-              <a:rPr lang="ko-KR" altLang="en-US" dirty="0" smtClean="0"/>
+              <a:rPr lang="ko-KR" altLang="en-US" dirty="0"/>
               <a:t>도형은 하나의 </a:t>
             </a:r>
             <a:r>
-              <a:rPr lang="en-US" altLang="ko-KR" dirty="0" smtClean="0"/>
+              <a:rPr lang="en-US" altLang="ko-KR" dirty="0"/>
               <a:t>＂</a:t>
             </a:r>
             <a:r>
-              <a:rPr lang="ko-KR" altLang="en-US" dirty="0" smtClean="0"/>
+              <a:rPr lang="ko-KR" altLang="en-US" dirty="0"/>
               <a:t>파일</a:t>
             </a:r>
             <a:r>
-              <a:rPr lang="en-US" altLang="ko-KR" dirty="0" smtClean="0"/>
+              <a:rPr lang="en-US" altLang="ko-KR" dirty="0"/>
               <a:t>(</a:t>
             </a:r>
             <a:r>
-              <a:rPr lang="ko-KR" altLang="en-US" dirty="0" err="1" smtClean="0"/>
+              <a:rPr lang="ko-KR" altLang="en-US" dirty="0" err="1"/>
               <a:t>커밋</a:t>
             </a:r>
             <a:r>
-              <a:rPr lang="en-US" altLang="ko-KR" dirty="0" smtClean="0"/>
+              <a:rPr lang="en-US" altLang="ko-KR" dirty="0"/>
               <a:t>)＂</a:t>
             </a:r>
             <a:r>
-              <a:rPr lang="ko-KR" altLang="en-US" dirty="0" smtClean="0"/>
+              <a:rPr lang="ko-KR" altLang="en-US" dirty="0"/>
               <a:t>을 나타냄</a:t>
             </a:r>
-            <a:endParaRPr lang="en-US" altLang="ko-KR" dirty="0" smtClean="0"/>
-          </a:p>
-          <a:p>
-            <a:r>
-              <a:rPr lang="ko-KR" altLang="en-US" dirty="0" smtClean="0"/>
+            <a:endParaRPr lang="en-US" altLang="ko-KR" dirty="0"/>
+          </a:p>
+          <a:p>
+            <a:r>
+              <a:rPr lang="ko-KR" altLang="en-US" dirty="0"/>
               <a:t>동그라미는 </a:t>
             </a:r>
             <a:r>
-              <a:rPr lang="en-US" altLang="ko-KR" dirty="0" smtClean="0"/>
+              <a:rPr lang="en-US" altLang="ko-KR" dirty="0"/>
               <a:t>"</a:t>
             </a:r>
             <a:r>
-              <a:rPr lang="ko-KR" altLang="en-US" dirty="0" smtClean="0"/>
+              <a:rPr lang="ko-KR" altLang="en-US" dirty="0"/>
               <a:t>변경된 내용</a:t>
             </a:r>
             <a:r>
-              <a:rPr lang="en-US" altLang="ko-KR" dirty="0" smtClean="0"/>
+              <a:rPr lang="en-US" altLang="ko-KR" dirty="0"/>
               <a:t>(</a:t>
             </a:r>
             <a:r>
-              <a:rPr lang="ko-KR" altLang="en-US" dirty="0" smtClean="0"/>
+              <a:rPr lang="ko-KR" altLang="en-US" dirty="0"/>
               <a:t>추가 된 코드</a:t>
             </a:r>
             <a:r>
-              <a:rPr lang="en-US" altLang="ko-KR" dirty="0" smtClean="0"/>
+              <a:rPr lang="en-US" altLang="ko-KR" dirty="0"/>
               <a:t>) </a:t>
             </a:r>
             <a:r>
-              <a:rPr lang="ko-KR" altLang="en-US" dirty="0" smtClean="0"/>
+              <a:rPr lang="ko-KR" altLang="en-US" dirty="0"/>
               <a:t>상징</a:t>
             </a:r>
-            <a:endParaRPr lang="en-US" altLang="ko-KR" dirty="0" smtClean="0"/>
-          </a:p>
-          <a:p>
-            <a:endParaRPr lang="en-US" altLang="ko-KR" dirty="0" smtClean="0"/>
+            <a:endParaRPr lang="en-US" altLang="ko-KR" dirty="0"/>
+          </a:p>
+          <a:p>
+            <a:endParaRPr lang="en-US" altLang="ko-KR" dirty="0"/>
           </a:p>
           <a:p>
             <a:pPr marL="228600" indent="-228600">
               <a:buAutoNum type="arabicPeriod"/>
             </a:pPr>
             <a:r>
-              <a:rPr lang="ko-KR" altLang="en-US" dirty="0" smtClean="0"/>
+              <a:rPr lang="ko-KR" altLang="en-US" dirty="0"/>
               <a:t>왼쪽 도형</a:t>
             </a:r>
             <a:r>
-              <a:rPr lang="en-US" altLang="ko-KR" dirty="0" smtClean="0"/>
+              <a:rPr lang="en-US" altLang="ko-KR" dirty="0"/>
               <a:t>(</a:t>
             </a:r>
             <a:r>
-              <a:rPr lang="ko-KR" altLang="en-US" dirty="0" smtClean="0"/>
+              <a:rPr lang="ko-KR" altLang="en-US" dirty="0"/>
               <a:t>기존 </a:t>
             </a:r>
             <a:r>
-              <a:rPr lang="ko-KR" altLang="en-US" dirty="0" err="1" smtClean="0"/>
+              <a:rPr lang="ko-KR" altLang="en-US" dirty="0" err="1"/>
               <a:t>브랜치</a:t>
             </a:r>
             <a:r>
-              <a:rPr lang="en-US" altLang="ko-KR" dirty="0" smtClean="0"/>
+              <a:rPr lang="en-US" altLang="ko-KR" dirty="0"/>
               <a:t>) </a:t>
             </a:r>
             <a:r>
-              <a:rPr lang="ko-KR" altLang="en-US" dirty="0" smtClean="0"/>
+              <a:rPr lang="ko-KR" altLang="en-US" dirty="0"/>
               <a:t>변화 없음 </a:t>
             </a:r>
             <a:r>
-              <a:rPr lang="en-US" altLang="ko-KR" dirty="0" smtClean="0"/>
+              <a:rPr lang="en-US" altLang="ko-KR" dirty="0"/>
               <a:t>/ </a:t>
             </a:r>
             <a:r>
-              <a:rPr lang="ko-KR" altLang="en-US" dirty="0" smtClean="0"/>
+              <a:rPr lang="ko-KR" altLang="en-US" dirty="0"/>
               <a:t>오른쪽 도형</a:t>
             </a:r>
             <a:r>
-              <a:rPr lang="en-US" altLang="ko-KR" dirty="0" smtClean="0"/>
+              <a:rPr lang="en-US" altLang="ko-KR" dirty="0"/>
               <a:t>(</a:t>
             </a:r>
             <a:r>
-              <a:rPr lang="ko-KR" altLang="en-US" dirty="0" smtClean="0"/>
+              <a:rPr lang="ko-KR" altLang="en-US" dirty="0"/>
               <a:t>다른 </a:t>
             </a:r>
             <a:r>
-              <a:rPr lang="ko-KR" altLang="en-US" dirty="0" err="1" smtClean="0"/>
+              <a:rPr lang="ko-KR" altLang="en-US" dirty="0" err="1"/>
               <a:t>브랜치</a:t>
             </a:r>
             <a:r>
-              <a:rPr lang="en-US" altLang="ko-KR" dirty="0" smtClean="0"/>
+              <a:rPr lang="en-US" altLang="ko-KR" dirty="0"/>
               <a:t>)</a:t>
             </a:r>
             <a:r>
-              <a:rPr lang="ko-KR" altLang="en-US" dirty="0" smtClean="0"/>
+              <a:rPr lang="ko-KR" altLang="en-US" dirty="0"/>
               <a:t>에서만 새 변화가 생김</a:t>
             </a:r>
             <a:r>
-              <a:rPr lang="en-US" altLang="ko-KR" dirty="0" smtClean="0"/>
+              <a:rPr lang="en-US" altLang="ko-KR" dirty="0"/>
               <a:t>.</a:t>
             </a:r>
           </a:p>
@@ -1362,15 +1361,15 @@
               <a:buNone/>
             </a:pPr>
             <a:r>
-              <a:rPr lang="en-US" altLang="ko-KR" dirty="0" smtClean="0"/>
+              <a:rPr lang="en-US" altLang="ko-KR" dirty="0"/>
               <a:t>= fast-forward (</a:t>
             </a:r>
             <a:r>
-              <a:rPr lang="ko-KR" altLang="en-US" dirty="0" err="1" smtClean="0"/>
+              <a:rPr lang="ko-KR" altLang="en-US" dirty="0" err="1"/>
               <a:t>빨리감기</a:t>
             </a:r>
             <a:r>
-              <a:rPr lang="en-US" altLang="ko-KR" dirty="0" smtClean="0"/>
+              <a:rPr lang="en-US" altLang="ko-KR" dirty="0"/>
               <a:t>)</a:t>
             </a:r>
           </a:p>
@@ -1378,29 +1377,29 @@
             <a:pPr marL="0" indent="0">
               <a:buNone/>
             </a:pPr>
-            <a:endParaRPr lang="en-US" altLang="ko-KR" dirty="0" smtClean="0"/>
+            <a:endParaRPr lang="en-US" altLang="ko-KR" dirty="0"/>
           </a:p>
           <a:p>
             <a:pPr marL="0" indent="0">
               <a:buNone/>
             </a:pPr>
             <a:r>
-              <a:rPr lang="en-US" altLang="ko-KR" dirty="0" smtClean="0"/>
+              <a:rPr lang="en-US" altLang="ko-KR" dirty="0"/>
               <a:t>2. </a:t>
             </a:r>
             <a:r>
-              <a:rPr lang="ko-KR" altLang="en-US" dirty="0" smtClean="0"/>
+              <a:rPr lang="ko-KR" altLang="en-US" dirty="0"/>
               <a:t>두 </a:t>
             </a:r>
             <a:r>
-              <a:rPr lang="ko-KR" altLang="en-US" dirty="0" err="1" smtClean="0"/>
+              <a:rPr lang="ko-KR" altLang="en-US" dirty="0" err="1"/>
               <a:t>브랜치</a:t>
             </a:r>
             <a:r>
-              <a:rPr lang="ko-KR" altLang="en-US" dirty="0" smtClean="0"/>
+              <a:rPr lang="ko-KR" altLang="en-US" dirty="0"/>
               <a:t> 모두 서로 다른 곳을 수정</a:t>
             </a:r>
-            <a:endParaRPr lang="en-US" altLang="ko-KR" dirty="0" smtClean="0"/>
+            <a:endParaRPr lang="en-US" altLang="ko-KR" dirty="0"/>
           </a:p>
           <a:p>
             <a:pPr marL="171450" indent="-171450">
@@ -1408,34 +1407,26 @@
               <a:buChar char="-"/>
             </a:pPr>
             <a:r>
-              <a:rPr lang="ko-KR" altLang="en-US" dirty="0" smtClean="0"/>
-              <a:t>서로 </a:t>
-            </a:r>
-            <a:r>
-              <a:rPr lang="ko-KR" altLang="en-US" dirty="0" smtClean="0"/>
-              <a:t>충돌하지 않는 내용 </a:t>
-            </a:r>
-            <a:r>
-              <a:rPr lang="en-US" altLang="ko-KR" dirty="0" smtClean="0"/>
+              <a:rPr lang="ko-KR" altLang="en-US" dirty="0"/>
+              <a:t>서로 충돌하지 않는 내용 </a:t>
+            </a:r>
+            <a:r>
+              <a:rPr lang="en-US" altLang="ko-KR" dirty="0"/>
               <a:t>-&gt; </a:t>
             </a:r>
             <a:r>
-              <a:rPr lang="en-US" altLang="ko-KR" dirty="0" err="1" smtClean="0"/>
+              <a:rPr lang="en-US" altLang="ko-KR" dirty="0" err="1"/>
               <a:t>git</a:t>
             </a:r>
             <a:r>
-              <a:rPr lang="ko-KR" altLang="en-US" dirty="0" smtClean="0"/>
-              <a:t>이 </a:t>
-            </a:r>
-            <a:r>
-              <a:rPr lang="ko-KR" altLang="en-US" dirty="0" smtClean="0"/>
-              <a:t>알아서 두 내용을 </a:t>
-            </a:r>
-            <a:r>
-              <a:rPr lang="ko-KR" altLang="en-US" dirty="0" err="1" smtClean="0"/>
+              <a:rPr lang="ko-KR" altLang="en-US" dirty="0"/>
+              <a:t>이 알아서 두 내용을 </a:t>
+            </a:r>
+            <a:r>
+              <a:rPr lang="ko-KR" altLang="en-US" dirty="0" err="1"/>
               <a:t>합쳐줌</a:t>
             </a:r>
-            <a:endParaRPr lang="en-US" altLang="ko-KR" dirty="0" smtClean="0"/>
+            <a:endParaRPr lang="en-US" altLang="ko-KR" dirty="0"/>
           </a:p>
           <a:p>
             <a:pPr marL="0" indent="0">
@@ -1443,7 +1434,7 @@
               <a:buNone/>
             </a:pPr>
             <a:r>
-              <a:rPr lang="en-US" altLang="ko-KR" dirty="0" smtClean="0"/>
+              <a:rPr lang="en-US" altLang="ko-KR" dirty="0"/>
               <a:t>3-way merge</a:t>
             </a:r>
           </a:p>
@@ -1453,11 +1444,11 @@
               <a:buNone/>
             </a:pPr>
             <a:r>
-              <a:rPr lang="ko-KR" altLang="en-US" dirty="0" smtClean="0"/>
+              <a:rPr lang="ko-KR" altLang="en-US" dirty="0"/>
               <a:t>뜻</a:t>
             </a:r>
             <a:r>
-              <a:rPr lang="en-US" altLang="ko-KR" dirty="0" smtClean="0"/>
+              <a:rPr lang="en-US" altLang="ko-KR" dirty="0"/>
               <a:t>,</a:t>
             </a:r>
           </a:p>
@@ -1467,10 +1458,10 @@
               <a:buAutoNum type="arabicPeriod"/>
             </a:pPr>
             <a:r>
-              <a:rPr lang="ko-KR" altLang="en-US" dirty="0" smtClean="0"/>
+              <a:rPr lang="ko-KR" altLang="en-US" dirty="0"/>
               <a:t>공통 조상</a:t>
             </a:r>
-            <a:endParaRPr lang="en-US" altLang="ko-KR" dirty="0" smtClean="0"/>
+            <a:endParaRPr lang="en-US" altLang="ko-KR" dirty="0"/>
           </a:p>
           <a:p>
             <a:pPr marL="228600" indent="-228600">
@@ -1478,14 +1469,14 @@
               <a:buAutoNum type="arabicPeriod"/>
             </a:pPr>
             <a:r>
-              <a:rPr lang="ko-KR" altLang="en-US" dirty="0" smtClean="0"/>
+              <a:rPr lang="ko-KR" altLang="en-US" dirty="0"/>
               <a:t>현재 </a:t>
             </a:r>
             <a:r>
-              <a:rPr lang="ko-KR" altLang="en-US" dirty="0" err="1" smtClean="0"/>
+              <a:rPr lang="ko-KR" altLang="en-US" dirty="0" err="1"/>
               <a:t>브랜치</a:t>
             </a:r>
-            <a:endParaRPr lang="en-US" altLang="ko-KR" dirty="0" smtClean="0"/>
+            <a:endParaRPr lang="en-US" altLang="ko-KR" dirty="0"/>
           </a:p>
           <a:p>
             <a:pPr marL="228600" indent="-228600">
@@ -1493,14 +1484,14 @@
               <a:buAutoNum type="arabicPeriod"/>
             </a:pPr>
             <a:r>
-              <a:rPr lang="ko-KR" altLang="en-US" dirty="0" smtClean="0"/>
+              <a:rPr lang="ko-KR" altLang="en-US" dirty="0"/>
               <a:t>병합 대상 </a:t>
             </a:r>
             <a:r>
-              <a:rPr lang="ko-KR" altLang="en-US" dirty="0" err="1" smtClean="0"/>
+              <a:rPr lang="ko-KR" altLang="en-US" dirty="0" err="1"/>
               <a:t>브랜치</a:t>
             </a:r>
-            <a:endParaRPr lang="en-US" altLang="ko-KR" dirty="0" smtClean="0"/>
+            <a:endParaRPr lang="en-US" altLang="ko-KR" dirty="0"/>
           </a:p>
           <a:p>
             <a:pPr marL="171450" indent="-171450">
@@ -1508,19 +1499,19 @@
               <a:buChar char="-"/>
             </a:pPr>
             <a:r>
-              <a:rPr lang="ko-KR" altLang="en-US" dirty="0" smtClean="0"/>
+              <a:rPr lang="ko-KR" altLang="en-US" dirty="0"/>
               <a:t>이 </a:t>
             </a:r>
             <a:r>
-              <a:rPr lang="en-US" altLang="ko-KR" dirty="0" smtClean="0"/>
+              <a:rPr lang="en-US" altLang="ko-KR" dirty="0"/>
               <a:t>3</a:t>
             </a:r>
             <a:r>
-              <a:rPr lang="ko-KR" altLang="en-US" dirty="0" smtClean="0"/>
+              <a:rPr lang="ko-KR" altLang="en-US" dirty="0"/>
               <a:t>가지를 비교해서 병합함</a:t>
             </a:r>
             <a:r>
-              <a:rPr lang="en-US" altLang="ko-KR" dirty="0" smtClean="0"/>
+              <a:rPr lang="en-US" altLang="ko-KR" dirty="0"/>
               <a:t>.</a:t>
             </a:r>
           </a:p>
@@ -1529,7 +1520,7 @@
               <a:buFontTx/>
               <a:buChar char="-"/>
             </a:pPr>
-            <a:endParaRPr lang="en-US" altLang="ko-KR" dirty="0" smtClean="0"/>
+            <a:endParaRPr lang="en-US" altLang="ko-KR" dirty="0"/>
           </a:p>
           <a:p>
             <a:pPr marL="0" indent="0">
@@ -1537,23 +1528,23 @@
               <a:buNone/>
             </a:pPr>
             <a:r>
-              <a:rPr lang="en-US" altLang="ko-KR" dirty="0" smtClean="0"/>
+              <a:rPr lang="en-US" altLang="ko-KR" dirty="0"/>
               <a:t>3. </a:t>
             </a:r>
             <a:r>
-              <a:rPr lang="ko-KR" altLang="en-US" dirty="0" smtClean="0"/>
+              <a:rPr lang="ko-KR" altLang="en-US" dirty="0"/>
               <a:t>두 </a:t>
             </a:r>
             <a:r>
-              <a:rPr lang="ko-KR" altLang="en-US" dirty="0" err="1" smtClean="0"/>
+              <a:rPr lang="ko-KR" altLang="en-US" dirty="0" err="1"/>
               <a:t>브랜치가</a:t>
             </a:r>
             <a:r>
-              <a:rPr lang="ko-KR" altLang="en-US" dirty="0" smtClean="0"/>
+              <a:rPr lang="ko-KR" altLang="en-US" dirty="0"/>
               <a:t> 같은 위치를 다르게 수정함</a:t>
             </a:r>
             <a:r>
-              <a:rPr lang="en-US" altLang="ko-KR" dirty="0" smtClean="0"/>
+              <a:rPr lang="en-US" altLang="ko-KR" dirty="0"/>
               <a:t>.</a:t>
             </a:r>
           </a:p>
@@ -1563,23 +1554,23 @@
               <a:buChar char="-"/>
             </a:pPr>
             <a:r>
-              <a:rPr lang="en-US" altLang="ko-KR" dirty="0" err="1" smtClean="0"/>
+              <a:rPr lang="en-US" altLang="ko-KR" dirty="0" err="1"/>
               <a:t>git</a:t>
             </a:r>
             <a:r>
-              <a:rPr lang="ko-KR" altLang="en-US" dirty="0" smtClean="0"/>
+              <a:rPr lang="ko-KR" altLang="en-US" dirty="0"/>
               <a:t>은 </a:t>
             </a:r>
             <a:r>
-              <a:rPr lang="ko-KR" altLang="en-US" dirty="0" err="1" smtClean="0"/>
+              <a:rPr lang="ko-KR" altLang="en-US" dirty="0" err="1"/>
               <a:t>어느게</a:t>
             </a:r>
             <a:r>
-              <a:rPr lang="ko-KR" altLang="en-US" dirty="0" smtClean="0"/>
+              <a:rPr lang="ko-KR" altLang="en-US" dirty="0"/>
               <a:t> 맞는지 스스로 결정하지 못함</a:t>
             </a:r>
             <a:r>
-              <a:rPr lang="en-US" altLang="ko-KR" dirty="0" smtClean="0"/>
+              <a:rPr lang="en-US" altLang="ko-KR" dirty="0"/>
               <a:t>.</a:t>
             </a:r>
           </a:p>
@@ -1589,28 +1580,27 @@
               <a:buNone/>
             </a:pPr>
             <a:r>
-              <a:rPr lang="ko-KR" altLang="en-US" dirty="0" smtClean="0"/>
+              <a:rPr lang="ko-KR" altLang="en-US" dirty="0"/>
               <a:t>**충돌** 발생 </a:t>
             </a:r>
             <a:r>
-              <a:rPr lang="en-US" altLang="ko-KR" dirty="0" smtClean="0">
+              <a:rPr lang="en-US" altLang="ko-KR" dirty="0">
                 <a:sym typeface="Wingdings" panose="05000000000000000000" pitchFamily="2" charset="2"/>
               </a:rPr>
               <a:t></a:t>
             </a:r>
             <a:r>
-              <a:rPr lang="en-US" altLang="ko-KR" dirty="0" smtClean="0"/>
+              <a:rPr lang="en-US" altLang="ko-KR" dirty="0"/>
               <a:t> </a:t>
             </a:r>
             <a:r>
-              <a:rPr lang="ko-KR" altLang="en-US" dirty="0" smtClean="0"/>
+              <a:rPr lang="ko-KR" altLang="en-US" dirty="0"/>
               <a:t>해결해야함</a:t>
             </a:r>
             <a:r>
-              <a:rPr lang="en-US" altLang="ko-KR" dirty="0" smtClean="0"/>
+              <a:rPr lang="en-US" altLang="ko-KR" dirty="0"/>
               <a:t>.</a:t>
             </a:r>
-            <a:endParaRPr lang="en-US" altLang="ko-KR" dirty="0"/>
           </a:p>
         </p:txBody>
       </p:sp>
@@ -1700,31 +1690,27 @@
             </a:r>
             <a:r>
               <a:rPr lang="ko-KR" altLang="en-US" dirty="0"/>
-              <a:t>후 </a:t>
-            </a:r>
-            <a:r>
-              <a:rPr lang="ko-KR" altLang="en-US" dirty="0" smtClean="0"/>
-              <a:t>로컬</a:t>
-            </a:r>
-            <a:endParaRPr lang="en-US" altLang="ko-KR" dirty="0" smtClean="0"/>
-          </a:p>
-          <a:p>
-            <a:endParaRPr lang="en-US" altLang="ko-KR" dirty="0" smtClean="0"/>
-          </a:p>
-          <a:p>
-            <a:r>
-              <a:rPr lang="ko-KR" altLang="en-US" dirty="0" smtClean="0"/>
+              <a:t>후 로컬</a:t>
+            </a:r>
+            <a:endParaRPr lang="en-US" altLang="ko-KR" dirty="0"/>
+          </a:p>
+          <a:p>
+            <a:endParaRPr lang="en-US" altLang="ko-KR" dirty="0"/>
+          </a:p>
+          <a:p>
+            <a:r>
+              <a:rPr lang="ko-KR" altLang="en-US" dirty="0"/>
               <a:t>특징 </a:t>
             </a:r>
             <a:r>
-              <a:rPr lang="en-US" altLang="ko-KR" dirty="0" smtClean="0"/>
+              <a:rPr lang="en-US" altLang="ko-KR" dirty="0"/>
               <a:t>: </a:t>
             </a:r>
             <a:r>
-              <a:rPr lang="ko-KR" altLang="en-US" dirty="0" smtClean="0"/>
+              <a:rPr lang="ko-KR" altLang="en-US" dirty="0"/>
               <a:t>충돌 없이 병합</a:t>
             </a:r>
-            <a:endParaRPr lang="en-US" altLang="ko-KR" dirty="0" smtClean="0"/>
+            <a:endParaRPr lang="en-US" altLang="ko-KR" dirty="0"/>
           </a:p>
         </p:txBody>
       </p:sp>
@@ -2308,13 +2294,6 @@
               </a:rPr>
               <a:t>해서 원격저장소에 반영 후 </a:t>
             </a:r>
-            <a:r>
-              <a:rPr lang="en-US" altLang="ko-KR" sz="1200" dirty="0">
-                <a:latin typeface="G마켓 산스 TTF Medium" panose="02000000000000000000" pitchFamily="2" charset="-127"/>
-                <a:ea typeface="G마켓 산스 TTF Medium" panose="02000000000000000000" pitchFamily="2" charset="-127"/>
-              </a:rPr>
-              <a:t/>
-            </a:r>
             <a:br>
               <a:rPr lang="en-US" altLang="ko-KR" sz="1200" dirty="0">
                 <a:latin typeface="G마켓 산스 TTF Medium" panose="02000000000000000000" pitchFamily="2" charset="-127"/>
@@ -2340,112 +2319,105 @@
                 <a:latin typeface="G마켓 산스 TTF Medium" panose="02000000000000000000" pitchFamily="2" charset="-127"/>
                 <a:ea typeface="G마켓 산스 TTF Medium" panose="02000000000000000000" pitchFamily="2" charset="-127"/>
               </a:rPr>
-              <a:t> </a:t>
-            </a:r>
-            <a:r>
-              <a:rPr lang="ko-KR" altLang="en-US" sz="1200" dirty="0" smtClean="0">
-                <a:latin typeface="G마켓 산스 TTF Medium" panose="02000000000000000000" pitchFamily="2" charset="-127"/>
-                <a:ea typeface="G마켓 산스 TTF Medium" panose="02000000000000000000" pitchFamily="2" charset="-127"/>
-              </a:rPr>
-              <a:t>삭제</a:t>
-            </a:r>
-            <a:endParaRPr lang="en-US" altLang="ko-KR" sz="1200" dirty="0" smtClean="0">
+              <a:t> 삭제</a:t>
+            </a:r>
+            <a:endParaRPr lang="en-US" altLang="ko-KR" sz="1200" dirty="0">
               <a:latin typeface="G마켓 산스 TTF Medium" panose="02000000000000000000" pitchFamily="2" charset="-127"/>
               <a:ea typeface="G마켓 산스 TTF Medium" panose="02000000000000000000" pitchFamily="2" charset="-127"/>
             </a:endParaRPr>
           </a:p>
           <a:p>
-            <a:endParaRPr lang="en-US" altLang="ko-KR" sz="1200" dirty="0" smtClean="0">
+            <a:endParaRPr lang="en-US" altLang="ko-KR" sz="1200" dirty="0">
               <a:ea typeface="G마켓 산스 TTF Medium" panose="02000000000000000000" pitchFamily="2" charset="-127"/>
             </a:endParaRPr>
           </a:p>
           <a:p>
             <a:r>
-              <a:rPr lang="en-US" altLang="ko-KR" dirty="0" err="1" smtClean="0"/>
+              <a:rPr lang="en-US" altLang="ko-KR" dirty="0" err="1"/>
               <a:t>Git</a:t>
             </a:r>
             <a:r>
-              <a:rPr lang="ko-KR" altLang="en-US" dirty="0" smtClean="0"/>
+              <a:rPr lang="ko-KR" altLang="en-US" dirty="0"/>
               <a:t>에서 병합</a:t>
             </a:r>
             <a:r>
-              <a:rPr lang="en-US" altLang="ko-KR" dirty="0" smtClean="0"/>
+              <a:rPr lang="en-US" altLang="ko-KR" dirty="0"/>
               <a:t>(merge)</a:t>
             </a:r>
             <a:r>
-              <a:rPr lang="ko-KR" altLang="en-US" dirty="0" smtClean="0"/>
+              <a:rPr lang="ko-KR" altLang="en-US" dirty="0"/>
               <a:t>할 때</a:t>
             </a:r>
             <a:r>
-              <a:rPr lang="en-US" altLang="ko-KR" dirty="0" smtClean="0"/>
+              <a:rPr lang="en-US" altLang="ko-KR" dirty="0"/>
               <a:t>, </a:t>
             </a:r>
             <a:r>
-              <a:rPr lang="ko-KR" altLang="en-US" dirty="0" smtClean="0"/>
+              <a:rPr lang="ko-KR" altLang="en-US" dirty="0"/>
               <a:t>내부적으로 어떤 방식으로 충돌을 해결하고 파일을 합칠지를 결정하는 </a:t>
             </a:r>
             <a:r>
-              <a:rPr lang="ko-KR" altLang="en-US" b="1" dirty="0" smtClean="0"/>
+              <a:rPr lang="ko-KR" altLang="en-US" b="1" dirty="0"/>
               <a:t>병합 엔진</a:t>
             </a:r>
             <a:r>
-              <a:rPr lang="ko-KR" altLang="en-US" dirty="0" smtClean="0"/>
+              <a:rPr lang="ko-KR" altLang="en-US" dirty="0"/>
               <a:t>입니다</a:t>
             </a:r>
             <a:r>
-              <a:rPr lang="en-US" altLang="ko-KR" dirty="0" smtClean="0"/>
+              <a:rPr lang="en-US" altLang="ko-KR" dirty="0"/>
               <a:t>.</a:t>
             </a:r>
           </a:p>
           <a:p>
             <a:r>
-              <a:rPr lang="ko-KR" altLang="en-US" dirty="0" smtClean="0"/>
+              <a:rPr lang="ko-KR" altLang="en-US" dirty="0"/>
               <a:t>📌 쉽게 말해</a:t>
             </a:r>
             <a:r>
-              <a:rPr lang="en-US" altLang="ko-KR" dirty="0" smtClean="0"/>
+              <a:rPr lang="en-US" altLang="ko-KR" dirty="0"/>
               <a:t>:</a:t>
             </a:r>
           </a:p>
           <a:p>
             <a:r>
-              <a:rPr lang="en-US" altLang="ko-KR" dirty="0" err="1" smtClean="0"/>
+              <a:rPr lang="en-US" altLang="ko-KR" dirty="0" err="1"/>
               <a:t>git</a:t>
             </a:r>
             <a:r>
-              <a:rPr lang="en-US" altLang="ko-KR" dirty="0" smtClean="0"/>
+              <a:rPr lang="en-US" altLang="ko-KR" dirty="0"/>
               <a:t> merge</a:t>
             </a:r>
             <a:r>
-              <a:rPr lang="ko-KR" altLang="en-US" dirty="0" smtClean="0"/>
+              <a:rPr lang="ko-KR" altLang="en-US" dirty="0"/>
               <a:t>를 했을 때</a:t>
             </a:r>
             <a:r>
-              <a:rPr lang="en-US" altLang="ko-KR" dirty="0" smtClean="0"/>
+              <a:rPr lang="en-US" altLang="ko-KR" dirty="0"/>
               <a:t>, **"</a:t>
             </a:r>
             <a:r>
-              <a:rPr lang="ko-KR" altLang="en-US" dirty="0" smtClean="0"/>
+              <a:rPr lang="ko-KR" altLang="en-US" dirty="0"/>
               <a:t>어떻게 두 </a:t>
             </a:r>
             <a:r>
-              <a:rPr lang="ko-KR" altLang="en-US" dirty="0" err="1" smtClean="0"/>
+              <a:rPr lang="ko-KR" altLang="en-US" dirty="0" err="1"/>
               <a:t>커밋을</a:t>
             </a:r>
             <a:r>
-              <a:rPr lang="ko-KR" altLang="en-US" dirty="0" smtClean="0"/>
+              <a:rPr lang="ko-KR" altLang="en-US" dirty="0"/>
               <a:t> 합칠까</a:t>
             </a:r>
             <a:r>
-              <a:rPr lang="en-US" altLang="ko-KR" dirty="0" smtClean="0"/>
+              <a:rPr lang="en-US" altLang="ko-KR" dirty="0"/>
               <a:t>?"**</a:t>
             </a:r>
             <a:r>
-              <a:rPr lang="ko-KR" altLang="en-US" dirty="0" smtClean="0"/>
+              <a:rPr lang="ko-KR" altLang="en-US" dirty="0"/>
               <a:t>를 처리하는 전략 중 하나예요</a:t>
             </a:r>
             <a:r>
-              <a:rPr lang="en-US" altLang="ko-KR" dirty="0" smtClean="0"/>
+              <a:rPr lang="en-US" altLang="ko-KR" dirty="0"/>
               <a:t>.</a:t>
             </a:r>
           </a:p>
@@ -2823,7 +2795,7 @@
           <a:bodyPr/>
           <a:lstStyle/>
           <a:p>
-            <a:endParaRPr lang="ko-KR" altLang="en-US"/>
+            <a:endParaRPr lang="ko-KR" altLang="en-US" dirty="0"/>
           </a:p>
         </p:txBody>
       </p:sp>
@@ -3567,80 +3539,80 @@
           <a:lstStyle/>
           <a:p>
             <a:r>
-              <a:rPr lang="ko-KR" altLang="en-US" b="1" dirty="0" smtClean="0"/>
+              <a:rPr lang="ko-KR" altLang="en-US" b="1" dirty="0"/>
               <a:t>✅ 버전 </a:t>
             </a:r>
             <a:r>
-              <a:rPr lang="ko-KR" altLang="en-US" b="1" dirty="0" err="1" smtClean="0"/>
+              <a:rPr lang="ko-KR" altLang="en-US" b="1" dirty="0" err="1"/>
               <a:t>번호란</a:t>
             </a:r>
             <a:r>
-              <a:rPr lang="en-US" altLang="ko-KR" b="1" dirty="0" smtClean="0"/>
+              <a:rPr lang="en-US" altLang="ko-KR" b="1" dirty="0"/>
               <a:t>?</a:t>
             </a:r>
           </a:p>
           <a:p>
             <a:r>
-              <a:rPr lang="ko-KR" altLang="en-US" dirty="0" smtClean="0"/>
+              <a:rPr lang="ko-KR" altLang="en-US" dirty="0"/>
               <a:t>버전 번호는 보통 </a:t>
             </a:r>
             <a:r>
-              <a:rPr lang="en-US" altLang="ko-KR" b="1" dirty="0" smtClean="0"/>
+              <a:rPr lang="en-US" altLang="ko-KR" b="1" dirty="0"/>
               <a:t>X.Y.Z</a:t>
             </a:r>
             <a:r>
-              <a:rPr lang="ko-KR" altLang="en-US" dirty="0" smtClean="0"/>
+              <a:rPr lang="ko-KR" altLang="en-US" dirty="0"/>
               <a:t> 형식으로 표기합니다</a:t>
             </a:r>
             <a:r>
-              <a:rPr lang="en-US" altLang="ko-KR" dirty="0" smtClean="0"/>
+              <a:rPr lang="en-US" altLang="ko-KR" dirty="0"/>
               <a:t>.</a:t>
             </a:r>
           </a:p>
           <a:p>
             <a:r>
-              <a:rPr lang="en-US" altLang="ko-KR" dirty="0" smtClean="0"/>
+              <a:rPr lang="en-US" altLang="ko-KR" dirty="0"/>
               <a:t>X: </a:t>
             </a:r>
             <a:r>
-              <a:rPr lang="ko-KR" altLang="en-US" b="1" dirty="0" err="1" smtClean="0"/>
+              <a:rPr lang="ko-KR" altLang="en-US" b="1" dirty="0" err="1"/>
               <a:t>주버전</a:t>
             </a:r>
             <a:r>
-              <a:rPr lang="en-US" altLang="ko-KR" b="1" dirty="0" smtClean="0"/>
+              <a:rPr lang="en-US" altLang="ko-KR" b="1" dirty="0"/>
               <a:t>(Major Version)</a:t>
             </a:r>
-            <a:endParaRPr lang="ko-KR" altLang="en-US" dirty="0" smtClean="0"/>
-          </a:p>
-          <a:p>
-            <a:r>
-              <a:rPr lang="en-US" altLang="ko-KR" dirty="0" smtClean="0"/>
+            <a:endParaRPr lang="ko-KR" altLang="en-US" dirty="0"/>
+          </a:p>
+          <a:p>
+            <a:r>
+              <a:rPr lang="en-US" altLang="ko-KR" dirty="0"/>
               <a:t>Y: </a:t>
             </a:r>
             <a:r>
-              <a:rPr lang="ko-KR" altLang="en-US" b="1" dirty="0" err="1" smtClean="0"/>
+              <a:rPr lang="ko-KR" altLang="en-US" b="1" dirty="0" err="1"/>
               <a:t>부버전</a:t>
             </a:r>
             <a:r>
-              <a:rPr lang="en-US" altLang="ko-KR" b="1" dirty="0" smtClean="0"/>
+              <a:rPr lang="en-US" altLang="ko-KR" b="1" dirty="0"/>
               <a:t>(Minor Version)</a:t>
             </a:r>
-            <a:endParaRPr lang="ko-KR" altLang="en-US" dirty="0" smtClean="0"/>
-          </a:p>
-          <a:p>
-            <a:r>
-              <a:rPr lang="en-US" altLang="ko-KR" dirty="0" smtClean="0"/>
+            <a:endParaRPr lang="ko-KR" altLang="en-US" dirty="0"/>
+          </a:p>
+          <a:p>
+            <a:r>
+              <a:rPr lang="en-US" altLang="ko-KR" dirty="0"/>
               <a:t>Z: </a:t>
             </a:r>
             <a:r>
-              <a:rPr lang="ko-KR" altLang="en-US" b="1" dirty="0" smtClean="0"/>
+              <a:rPr lang="ko-KR" altLang="en-US" b="1" dirty="0"/>
               <a:t>패치 버전</a:t>
             </a:r>
             <a:r>
-              <a:rPr lang="en-US" altLang="ko-KR" b="1" dirty="0" smtClean="0"/>
+              <a:rPr lang="en-US" altLang="ko-KR" b="1" dirty="0"/>
               <a:t>(Patch Version</a:t>
             </a:r>
-            <a:endParaRPr lang="ko-KR" altLang="en-US" dirty="0" smtClean="0"/>
+            <a:endParaRPr lang="ko-KR" altLang="en-US" dirty="0"/>
           </a:p>
           <a:p>
             <a:endParaRPr lang="ko-KR" altLang="en-US" dirty="0"/>
@@ -3899,223 +3871,223 @@
           <a:lstStyle/>
           <a:p>
             <a:r>
-              <a:rPr lang="en-US" altLang="ko-KR" dirty="0" err="1" smtClean="0"/>
+              <a:rPr lang="en-US" altLang="ko-KR" dirty="0" err="1"/>
               <a:t>git</a:t>
             </a:r>
             <a:r>
-              <a:rPr lang="ko-KR" altLang="en-US" dirty="0" smtClean="0"/>
+              <a:rPr lang="ko-KR" altLang="en-US" dirty="0"/>
               <a:t>은 </a:t>
             </a:r>
             <a:r>
-              <a:rPr lang="ko-KR" altLang="en-US" dirty="0" err="1" smtClean="0"/>
+              <a:rPr lang="ko-KR" altLang="en-US" dirty="0" err="1"/>
               <a:t>커밋을</a:t>
             </a:r>
             <a:r>
-              <a:rPr lang="ko-KR" altLang="en-US" dirty="0" smtClean="0"/>
+              <a:rPr lang="ko-KR" altLang="en-US" dirty="0"/>
               <a:t> </a:t>
             </a:r>
             <a:r>
-              <a:rPr lang="ko-KR" altLang="en-US" dirty="0" err="1" smtClean="0"/>
+              <a:rPr lang="ko-KR" altLang="en-US" dirty="0" err="1"/>
               <a:t>숫자로가</a:t>
             </a:r>
             <a:r>
-              <a:rPr lang="ko-KR" altLang="en-US" dirty="0" smtClean="0"/>
+              <a:rPr lang="ko-KR" altLang="en-US" dirty="0"/>
               <a:t> 아니라 참조 기반으로 표현함</a:t>
             </a:r>
             <a:r>
-              <a:rPr lang="en-US" altLang="ko-KR" dirty="0" smtClean="0"/>
+              <a:rPr lang="en-US" altLang="ko-KR" dirty="0"/>
               <a:t>.</a:t>
             </a:r>
           </a:p>
           <a:p>
             <a:r>
-              <a:rPr lang="ko-KR" altLang="en-US" dirty="0" smtClean="0"/>
+              <a:rPr lang="ko-KR" altLang="en-US" dirty="0"/>
               <a:t>가장 기본 참조는 </a:t>
             </a:r>
             <a:r>
-              <a:rPr lang="en-US" altLang="ko-KR" dirty="0" smtClean="0"/>
+              <a:rPr lang="en-US" altLang="ko-KR" dirty="0"/>
               <a:t>“HEAD” </a:t>
             </a:r>
             <a:r>
-              <a:rPr lang="ko-KR" altLang="en-US" dirty="0" smtClean="0"/>
+              <a:rPr lang="ko-KR" altLang="en-US" dirty="0"/>
               <a:t>현재 내가 가리키고 있는 </a:t>
             </a:r>
             <a:r>
-              <a:rPr lang="ko-KR" altLang="en-US" dirty="0" err="1" smtClean="0"/>
+              <a:rPr lang="ko-KR" altLang="en-US" dirty="0" err="1"/>
               <a:t>커밋</a:t>
             </a:r>
             <a:r>
-              <a:rPr lang="en-US" altLang="ko-KR" dirty="0" smtClean="0"/>
+              <a:rPr lang="en-US" altLang="ko-KR" dirty="0"/>
               <a:t>.</a:t>
             </a:r>
           </a:p>
           <a:p>
-            <a:endParaRPr lang="en-US" altLang="ko-KR" dirty="0" smtClean="0"/>
-          </a:p>
-          <a:p>
-            <a:r>
-              <a:rPr lang="en-US" altLang="ko-KR" dirty="0" err="1" smtClean="0"/>
+            <a:endParaRPr lang="en-US" altLang="ko-KR" dirty="0"/>
+          </a:p>
+          <a:p>
+            <a:r>
+              <a:rPr lang="en-US" altLang="ko-KR" dirty="0" err="1"/>
               <a:t>HEAD~</a:t>
             </a:r>
             <a:r>
-              <a:rPr lang="en-US" altLang="ko-KR" baseline="0" dirty="0" err="1" smtClean="0"/>
+              <a:rPr lang="en-US" altLang="ko-KR" baseline="0" dirty="0" err="1"/>
               <a:t>n</a:t>
             </a:r>
             <a:r>
-              <a:rPr lang="en-US" altLang="ko-KR" baseline="0" dirty="0" smtClean="0"/>
+              <a:rPr lang="en-US" altLang="ko-KR" baseline="0" dirty="0"/>
               <a:t> : </a:t>
             </a:r>
             <a:r>
-              <a:rPr lang="ko-KR" altLang="en-US" baseline="0" dirty="0" smtClean="0"/>
+              <a:rPr lang="ko-KR" altLang="en-US" baseline="0" dirty="0"/>
               <a:t>직전 </a:t>
             </a:r>
             <a:r>
-              <a:rPr lang="ko-KR" altLang="en-US" baseline="0" dirty="0" err="1" smtClean="0"/>
+              <a:rPr lang="ko-KR" altLang="en-US" baseline="0" dirty="0" err="1"/>
               <a:t>커밋에서</a:t>
             </a:r>
             <a:r>
-              <a:rPr lang="ko-KR" altLang="en-US" baseline="0" dirty="0" smtClean="0"/>
+              <a:rPr lang="ko-KR" altLang="en-US" baseline="0" dirty="0"/>
               <a:t> </a:t>
             </a:r>
             <a:r>
-              <a:rPr lang="en-US" altLang="ko-KR" baseline="0" dirty="0" smtClean="0"/>
+              <a:rPr lang="en-US" altLang="ko-KR" baseline="0" dirty="0"/>
               <a:t>n </a:t>
             </a:r>
             <a:r>
-              <a:rPr lang="ko-KR" altLang="en-US" baseline="0" dirty="0" smtClean="0"/>
+              <a:rPr lang="ko-KR" altLang="en-US" baseline="0" dirty="0"/>
               <a:t>단계 위</a:t>
             </a:r>
             <a:r>
-              <a:rPr lang="en-US" altLang="ko-KR" baseline="0" dirty="0" smtClean="0"/>
+              <a:rPr lang="en-US" altLang="ko-KR" baseline="0" dirty="0"/>
               <a:t>(</a:t>
             </a:r>
             <a:r>
-              <a:rPr lang="ko-KR" altLang="en-US" baseline="0" dirty="0" smtClean="0"/>
+              <a:rPr lang="ko-KR" altLang="en-US" baseline="0" dirty="0"/>
               <a:t>과거</a:t>
             </a:r>
             <a:r>
-              <a:rPr lang="en-US" altLang="ko-KR" baseline="0" dirty="0" smtClean="0"/>
+              <a:rPr lang="en-US" altLang="ko-KR" baseline="0" dirty="0"/>
               <a:t>)</a:t>
             </a:r>
             <a:r>
-              <a:rPr lang="ko-KR" altLang="en-US" baseline="0" dirty="0" smtClean="0"/>
+              <a:rPr lang="ko-KR" altLang="en-US" baseline="0" dirty="0"/>
               <a:t>로 올라감</a:t>
             </a:r>
-            <a:endParaRPr lang="en-US" altLang="ko-KR" baseline="0" dirty="0" smtClean="0"/>
-          </a:p>
-          <a:p>
-            <a:r>
-              <a:rPr lang="en-US" altLang="ko-KR" baseline="0" dirty="0" smtClean="0"/>
+            <a:endParaRPr lang="en-US" altLang="ko-KR" baseline="0" dirty="0"/>
+          </a:p>
+          <a:p>
+            <a:r>
+              <a:rPr lang="en-US" altLang="ko-KR" baseline="0" dirty="0"/>
               <a:t>HEAD~1 : </a:t>
             </a:r>
             <a:r>
-              <a:rPr lang="ko-KR" altLang="en-US" baseline="0" dirty="0" smtClean="0"/>
+              <a:rPr lang="ko-KR" altLang="en-US" baseline="0" dirty="0"/>
               <a:t>바로 이전 </a:t>
             </a:r>
             <a:r>
-              <a:rPr lang="ko-KR" altLang="en-US" baseline="0" dirty="0" err="1" smtClean="0"/>
+              <a:rPr lang="ko-KR" altLang="en-US" baseline="0" dirty="0" err="1"/>
               <a:t>커밋</a:t>
             </a:r>
-            <a:endParaRPr lang="en-US" altLang="ko-KR" baseline="0" dirty="0" smtClean="0"/>
-          </a:p>
-          <a:p>
-            <a:r>
-              <a:rPr lang="en-US" altLang="ko-KR" baseline="0" dirty="0" smtClean="0"/>
+            <a:endParaRPr lang="en-US" altLang="ko-KR" baseline="0" dirty="0"/>
+          </a:p>
+          <a:p>
+            <a:r>
+              <a:rPr lang="en-US" altLang="ko-KR" baseline="0" dirty="0"/>
               <a:t>HEAD~2 : </a:t>
             </a:r>
             <a:r>
-              <a:rPr lang="ko-KR" altLang="en-US" baseline="0" dirty="0" smtClean="0"/>
+              <a:rPr lang="ko-KR" altLang="en-US" baseline="0" dirty="0"/>
               <a:t>이전의 이전 </a:t>
             </a:r>
             <a:r>
-              <a:rPr lang="ko-KR" altLang="en-US" baseline="0" dirty="0" err="1" smtClean="0"/>
+              <a:rPr lang="ko-KR" altLang="en-US" baseline="0" dirty="0" err="1"/>
               <a:t>커밋</a:t>
             </a:r>
-            <a:endParaRPr lang="en-US" altLang="ko-KR" baseline="0" dirty="0" smtClean="0"/>
-          </a:p>
-          <a:p>
-            <a:endParaRPr lang="en-US" altLang="ko-KR" baseline="0" dirty="0" smtClean="0"/>
-          </a:p>
-          <a:p>
-            <a:r>
-              <a:rPr lang="en-US" altLang="ko-KR" baseline="0" dirty="0" err="1" smtClean="0"/>
+            <a:endParaRPr lang="en-US" altLang="ko-KR" baseline="0" dirty="0"/>
+          </a:p>
+          <a:p>
+            <a:endParaRPr lang="en-US" altLang="ko-KR" baseline="0" dirty="0"/>
+          </a:p>
+          <a:p>
+            <a:r>
+              <a:rPr lang="en-US" altLang="ko-KR" baseline="0" dirty="0" err="1"/>
               <a:t>HEAD^n</a:t>
             </a:r>
             <a:r>
-              <a:rPr lang="en-US" altLang="ko-KR" baseline="0" dirty="0" smtClean="0"/>
+              <a:rPr lang="en-US" altLang="ko-KR" baseline="0" dirty="0"/>
               <a:t> : </a:t>
             </a:r>
             <a:r>
-              <a:rPr lang="ko-KR" altLang="en-US" baseline="0" dirty="0" smtClean="0"/>
+              <a:rPr lang="ko-KR" altLang="en-US" baseline="0" dirty="0"/>
               <a:t>부모 중 </a:t>
             </a:r>
             <a:r>
-              <a:rPr lang="en-US" altLang="ko-KR" baseline="0" dirty="0" smtClean="0"/>
+              <a:rPr lang="en-US" altLang="ko-KR" baseline="0" dirty="0"/>
               <a:t>n</a:t>
             </a:r>
             <a:r>
-              <a:rPr lang="ko-KR" altLang="en-US" baseline="0" dirty="0" smtClean="0"/>
+              <a:rPr lang="ko-KR" altLang="en-US" baseline="0" dirty="0"/>
               <a:t>번째 </a:t>
             </a:r>
             <a:r>
-              <a:rPr lang="ko-KR" altLang="en-US" baseline="0" dirty="0" err="1" smtClean="0"/>
+              <a:rPr lang="ko-KR" altLang="en-US" baseline="0" dirty="0" err="1"/>
               <a:t>커밋으로</a:t>
             </a:r>
             <a:r>
-              <a:rPr lang="ko-KR" altLang="en-US" baseline="0" dirty="0" smtClean="0"/>
+              <a:rPr lang="ko-KR" altLang="en-US" baseline="0" dirty="0"/>
               <a:t> 이동</a:t>
             </a:r>
-            <a:endParaRPr lang="en-US" altLang="ko-KR" baseline="0" dirty="0" smtClean="0"/>
-          </a:p>
-          <a:p>
-            <a:r>
-              <a:rPr lang="ko-KR" altLang="en-US" baseline="0" dirty="0" smtClean="0"/>
+            <a:endParaRPr lang="en-US" altLang="ko-KR" baseline="0" dirty="0"/>
+          </a:p>
+          <a:p>
+            <a:r>
+              <a:rPr lang="ko-KR" altLang="en-US" baseline="0" dirty="0"/>
               <a:t>주로 병합 </a:t>
             </a:r>
             <a:r>
-              <a:rPr lang="ko-KR" altLang="en-US" baseline="0" dirty="0" err="1" smtClean="0"/>
+              <a:rPr lang="ko-KR" altLang="en-US" baseline="0" dirty="0" err="1"/>
               <a:t>커밋에서</a:t>
             </a:r>
             <a:r>
-              <a:rPr lang="ko-KR" altLang="en-US" baseline="0" dirty="0" smtClean="0"/>
+              <a:rPr lang="ko-KR" altLang="en-US" baseline="0" dirty="0"/>
               <a:t> 사용됨 </a:t>
             </a:r>
             <a:r>
-              <a:rPr lang="en-US" altLang="ko-KR" baseline="0" dirty="0" smtClean="0"/>
+              <a:rPr lang="en-US" altLang="ko-KR" baseline="0" dirty="0"/>
               <a:t>(merge commit)</a:t>
             </a:r>
           </a:p>
           <a:p>
             <a:r>
-              <a:rPr lang="en-US" altLang="ko-KR" baseline="0" dirty="0" smtClean="0"/>
+              <a:rPr lang="en-US" altLang="ko-KR" baseline="0" dirty="0"/>
               <a:t>HEAD^1 </a:t>
             </a:r>
             <a:r>
-              <a:rPr lang="en-US" altLang="ko-KR" baseline="0" dirty="0" smtClean="0">
+              <a:rPr lang="en-US" altLang="ko-KR" baseline="0" dirty="0">
                 <a:sym typeface="Wingdings" panose="05000000000000000000" pitchFamily="2" charset="2"/>
               </a:rPr>
               <a:t> </a:t>
             </a:r>
             <a:r>
-              <a:rPr lang="ko-KR" altLang="en-US" baseline="0" dirty="0" smtClean="0">
+              <a:rPr lang="ko-KR" altLang="en-US" baseline="0" dirty="0">
                 <a:sym typeface="Wingdings" panose="05000000000000000000" pitchFamily="2" charset="2"/>
               </a:rPr>
               <a:t>첫 번째 부모 </a:t>
             </a:r>
             <a:r>
-              <a:rPr lang="en-US" altLang="ko-KR" baseline="0" dirty="0" smtClean="0">
+              <a:rPr lang="en-US" altLang="ko-KR" baseline="0" dirty="0">
                 <a:sym typeface="Wingdings" panose="05000000000000000000" pitchFamily="2" charset="2"/>
               </a:rPr>
               <a:t>(main </a:t>
             </a:r>
             <a:r>
-              <a:rPr lang="ko-KR" altLang="en-US" baseline="0" dirty="0" err="1" smtClean="0">
+              <a:rPr lang="ko-KR" altLang="en-US" baseline="0" dirty="0" err="1">
                 <a:sym typeface="Wingdings" panose="05000000000000000000" pitchFamily="2" charset="2"/>
               </a:rPr>
               <a:t>브랜치</a:t>
             </a:r>
             <a:r>
-              <a:rPr lang="en-US" altLang="ko-KR" baseline="0" dirty="0" smtClean="0">
+              <a:rPr lang="en-US" altLang="ko-KR" baseline="0" dirty="0">
                 <a:sym typeface="Wingdings" panose="05000000000000000000" pitchFamily="2" charset="2"/>
               </a:rPr>
               <a:t>)</a:t>
@@ -4123,31 +4095,31 @@
           </a:p>
           <a:p>
             <a:r>
-              <a:rPr lang="en-US" altLang="ko-KR" baseline="0" dirty="0" smtClean="0">
+              <a:rPr lang="en-US" altLang="ko-KR" baseline="0" dirty="0">
                 <a:sym typeface="Wingdings" panose="05000000000000000000" pitchFamily="2" charset="2"/>
               </a:rPr>
               <a:t>HEAD^2  </a:t>
             </a:r>
             <a:r>
-              <a:rPr lang="ko-KR" altLang="en-US" baseline="0" dirty="0" smtClean="0">
+              <a:rPr lang="ko-KR" altLang="en-US" baseline="0" dirty="0">
                 <a:sym typeface="Wingdings" panose="05000000000000000000" pitchFamily="2" charset="2"/>
               </a:rPr>
               <a:t>두 번째 부모 </a:t>
             </a:r>
             <a:r>
-              <a:rPr lang="en-US" altLang="ko-KR" baseline="0" dirty="0" smtClean="0">
+              <a:rPr lang="en-US" altLang="ko-KR" baseline="0" dirty="0">
                 <a:sym typeface="Wingdings" panose="05000000000000000000" pitchFamily="2" charset="2"/>
               </a:rPr>
               <a:t>(feature </a:t>
             </a:r>
             <a:r>
-              <a:rPr lang="ko-KR" altLang="en-US" baseline="0" dirty="0" err="1" smtClean="0">
+              <a:rPr lang="ko-KR" altLang="en-US" baseline="0" dirty="0" err="1">
                 <a:sym typeface="Wingdings" panose="05000000000000000000" pitchFamily="2" charset="2"/>
               </a:rPr>
               <a:t>브랜치</a:t>
             </a:r>
             <a:r>
-              <a:rPr lang="en-US" altLang="ko-KR" baseline="0" dirty="0" smtClean="0">
+              <a:rPr lang="en-US" altLang="ko-KR" baseline="0" dirty="0">
                 <a:sym typeface="Wingdings" panose="05000000000000000000" pitchFamily="2" charset="2"/>
               </a:rPr>
               <a:t>)</a:t>
@@ -4155,30 +4127,30 @@
           </a:p>
           <a:p>
             <a:r>
-              <a:rPr lang="ko-KR" altLang="en-US" dirty="0" smtClean="0"/>
+              <a:rPr lang="ko-KR" altLang="en-US" dirty="0"/>
               <a:t>병합 </a:t>
             </a:r>
             <a:r>
-              <a:rPr lang="ko-KR" altLang="en-US" dirty="0" err="1" smtClean="0"/>
+              <a:rPr lang="ko-KR" altLang="en-US" dirty="0" err="1"/>
               <a:t>커밋에서</a:t>
             </a:r>
             <a:r>
-              <a:rPr lang="ko-KR" altLang="en-US" dirty="0" smtClean="0"/>
+              <a:rPr lang="ko-KR" altLang="en-US" dirty="0"/>
               <a:t> 어떤 부모로 되돌아갈지를 지정하는 것이 </a:t>
             </a:r>
             <a:r>
-              <a:rPr lang="en-US" altLang="ko-KR" dirty="0" err="1" smtClean="0"/>
+              <a:rPr lang="en-US" altLang="ko-KR" dirty="0" err="1"/>
               <a:t>HEAD^n</a:t>
             </a:r>
             <a:r>
-              <a:rPr lang="ko-KR" altLang="en-US" dirty="0" smtClean="0"/>
+              <a:rPr lang="ko-KR" altLang="en-US" dirty="0"/>
               <a:t>입니다</a:t>
             </a:r>
             <a:r>
-              <a:rPr lang="en-US" altLang="ko-KR" dirty="0" smtClean="0"/>
+              <a:rPr lang="en-US" altLang="ko-KR" dirty="0"/>
               <a:t>.</a:t>
             </a:r>
-            <a:endParaRPr lang="en-US" altLang="ko-KR" baseline="0" dirty="0" smtClean="0"/>
+            <a:endParaRPr lang="en-US" altLang="ko-KR" baseline="0" dirty="0"/>
           </a:p>
         </p:txBody>
       </p:sp>
@@ -4347,51 +4319,51 @@
           <a:lstStyle/>
           <a:p>
             <a:r>
-              <a:rPr lang="en-US" altLang="ko-KR" dirty="0" err="1" smtClean="0"/>
+              <a:rPr lang="en-US" altLang="ko-KR" dirty="0" err="1"/>
               <a:t>git</a:t>
             </a:r>
             <a:r>
-              <a:rPr lang="en-US" altLang="ko-KR" dirty="0" smtClean="0"/>
+              <a:rPr lang="en-US" altLang="ko-KR" dirty="0"/>
               <a:t> revert </a:t>
             </a:r>
             <a:r>
-              <a:rPr lang="ko-KR" altLang="en-US" dirty="0" smtClean="0"/>
+              <a:rPr lang="ko-KR" altLang="en-US" dirty="0"/>
               <a:t>명령어에서 </a:t>
             </a:r>
             <a:r>
-              <a:rPr lang="ko-KR" altLang="en-US" b="1" dirty="0" smtClean="0"/>
+              <a:rPr lang="ko-KR" altLang="en-US" b="1" dirty="0"/>
               <a:t>되돌릴 </a:t>
             </a:r>
             <a:r>
-              <a:rPr lang="ko-KR" altLang="en-US" b="1" dirty="0" err="1" smtClean="0"/>
+              <a:rPr lang="ko-KR" altLang="en-US" b="1" dirty="0" err="1"/>
               <a:t>커밋을</a:t>
             </a:r>
             <a:r>
-              <a:rPr lang="ko-KR" altLang="en-US" b="1" dirty="0" smtClean="0"/>
+              <a:rPr lang="ko-KR" altLang="en-US" b="1" dirty="0"/>
               <a:t> 지정할 때는 </a:t>
             </a:r>
             <a:r>
-              <a:rPr lang="en-US" altLang="ko-KR" b="1" dirty="0" smtClean="0"/>
+              <a:rPr lang="en-US" altLang="ko-KR" b="1" dirty="0"/>
               <a:t>"</a:t>
             </a:r>
             <a:r>
-              <a:rPr lang="ko-KR" altLang="en-US" b="1" dirty="0" err="1" smtClean="0"/>
+              <a:rPr lang="ko-KR" altLang="en-US" b="1" dirty="0" err="1"/>
               <a:t>커밋</a:t>
             </a:r>
             <a:r>
-              <a:rPr lang="ko-KR" altLang="en-US" b="1" dirty="0" smtClean="0"/>
+              <a:rPr lang="ko-KR" altLang="en-US" b="1" dirty="0"/>
               <a:t> 코드</a:t>
             </a:r>
             <a:r>
-              <a:rPr lang="en-US" altLang="ko-KR" b="1" dirty="0" smtClean="0"/>
+              <a:rPr lang="en-US" altLang="ko-KR" b="1" dirty="0"/>
               <a:t>(hash)"</a:t>
             </a:r>
             <a:r>
-              <a:rPr lang="ko-KR" altLang="en-US" b="1" dirty="0" smtClean="0"/>
+              <a:rPr lang="ko-KR" altLang="en-US" b="1" dirty="0"/>
               <a:t>를 입력해야 함</a:t>
             </a:r>
             <a:r>
-              <a:rPr lang="en-US" altLang="ko-KR" b="1" dirty="0" smtClean="0"/>
+              <a:rPr lang="en-US" altLang="ko-KR" b="1" dirty="0"/>
               <a:t>.</a:t>
             </a:r>
             <a:endParaRPr lang="ko-KR" altLang="en-US" dirty="0"/>
@@ -4773,93 +4745,92 @@
           <a:lstStyle/>
           <a:p>
             <a:r>
-              <a:rPr lang="en-US" altLang="ko-KR" dirty="0" err="1" smtClean="0"/>
+              <a:rPr lang="en-US" altLang="ko-KR" dirty="0" err="1"/>
               <a:t>git</a:t>
             </a:r>
             <a:r>
-              <a:rPr lang="en-US" altLang="ko-KR" dirty="0" smtClean="0"/>
+              <a:rPr lang="en-US" altLang="ko-KR" dirty="0"/>
               <a:t> log --</a:t>
             </a:r>
             <a:r>
-              <a:rPr lang="en-US" altLang="ko-KR" dirty="0" err="1" smtClean="0"/>
+              <a:rPr lang="en-US" altLang="ko-KR" dirty="0" err="1"/>
               <a:t>oneline</a:t>
             </a:r>
-            <a:endParaRPr lang="en-US" altLang="ko-KR" dirty="0" smtClean="0"/>
-          </a:p>
-          <a:p>
-            <a:r>
-              <a:rPr lang="en-US" altLang="ko-KR" dirty="0" err="1" smtClean="0"/>
+            <a:endParaRPr lang="en-US" altLang="ko-KR" dirty="0"/>
+          </a:p>
+          <a:p>
+            <a:r>
+              <a:rPr lang="en-US" altLang="ko-KR" dirty="0" err="1"/>
               <a:t>git</a:t>
             </a:r>
             <a:r>
-              <a:rPr lang="en-US" altLang="ko-KR" dirty="0" smtClean="0"/>
+              <a:rPr lang="en-US" altLang="ko-KR" dirty="0"/>
               <a:t> reset --hard 4c58666</a:t>
             </a:r>
           </a:p>
           <a:p>
             <a:r>
-              <a:rPr lang="ko-KR" altLang="en-US" dirty="0" smtClean="0"/>
+              <a:rPr lang="ko-KR" altLang="en-US" dirty="0"/>
               <a:t>이 명령을 실행하면</a:t>
             </a:r>
             <a:r>
-              <a:rPr lang="en-US" altLang="ko-KR" dirty="0" smtClean="0"/>
+              <a:rPr lang="en-US" altLang="ko-KR" dirty="0"/>
               <a:t>:</a:t>
             </a:r>
           </a:p>
           <a:p>
-            <a:endParaRPr lang="en-US" altLang="ko-KR" dirty="0" smtClean="0"/>
-          </a:p>
-          <a:p>
-            <a:r>
-              <a:rPr lang="ko-KR" altLang="en-US" dirty="0" smtClean="0"/>
+            <a:endParaRPr lang="en-US" altLang="ko-KR" dirty="0"/>
+          </a:p>
+          <a:p>
+            <a:r>
+              <a:rPr lang="ko-KR" altLang="en-US" dirty="0"/>
               <a:t>현재 </a:t>
             </a:r>
             <a:r>
-              <a:rPr lang="ko-KR" altLang="en-US" dirty="0" err="1" smtClean="0"/>
+              <a:rPr lang="ko-KR" altLang="en-US" dirty="0" err="1"/>
               <a:t>브랜치</a:t>
             </a:r>
             <a:r>
-              <a:rPr lang="en-US" altLang="ko-KR" dirty="0" smtClean="0"/>
+              <a:rPr lang="en-US" altLang="ko-KR" dirty="0"/>
               <a:t>(HEAD)</a:t>
             </a:r>
             <a:r>
-              <a:rPr lang="ko-KR" altLang="en-US" dirty="0" smtClean="0"/>
+              <a:rPr lang="ko-KR" altLang="en-US" dirty="0"/>
               <a:t>가 </a:t>
             </a:r>
             <a:r>
-              <a:rPr lang="en-US" altLang="ko-KR" dirty="0" smtClean="0"/>
+              <a:rPr lang="en-US" altLang="ko-KR" dirty="0"/>
               <a:t>c </a:t>
             </a:r>
             <a:r>
-              <a:rPr lang="ko-KR" altLang="en-US" dirty="0" err="1" smtClean="0"/>
+              <a:rPr lang="ko-KR" altLang="en-US" dirty="0" err="1"/>
               <a:t>커밋으로</a:t>
             </a:r>
             <a:r>
-              <a:rPr lang="ko-KR" altLang="en-US" dirty="0" smtClean="0"/>
+              <a:rPr lang="ko-KR" altLang="en-US" dirty="0"/>
               <a:t> 이동하고</a:t>
             </a:r>
           </a:p>
           <a:p>
-            <a:endParaRPr lang="ko-KR" altLang="en-US" dirty="0" smtClean="0"/>
-          </a:p>
-          <a:p>
-            <a:r>
-              <a:rPr lang="ko-KR" altLang="en-US" dirty="0" smtClean="0"/>
+            <a:endParaRPr lang="ko-KR" altLang="en-US" dirty="0"/>
+          </a:p>
+          <a:p>
+            <a:r>
+              <a:rPr lang="ko-KR" altLang="en-US" dirty="0"/>
               <a:t>그 이후에 있었던 </a:t>
             </a:r>
             <a:r>
-              <a:rPr lang="en-US" altLang="ko-KR" dirty="0" smtClean="0"/>
+              <a:rPr lang="en-US" altLang="ko-KR" dirty="0"/>
               <a:t>revert </a:t>
             </a:r>
             <a:r>
-              <a:rPr lang="ko-KR" altLang="en-US" dirty="0" err="1" smtClean="0"/>
+              <a:rPr lang="ko-KR" altLang="en-US" dirty="0" err="1"/>
               <a:t>커밋</a:t>
             </a:r>
             <a:r>
-              <a:rPr lang="ko-KR" altLang="en-US" dirty="0" smtClean="0"/>
+              <a:rPr lang="ko-KR" altLang="en-US" dirty="0"/>
               <a:t> 두 개는 사라짐</a:t>
             </a:r>
-            <a:endParaRPr lang="ko-KR" altLang="en-US" dirty="0"/>
           </a:p>
         </p:txBody>
       </p:sp>
@@ -5320,7 +5291,7 @@
           <a:bodyPr/>
           <a:lstStyle/>
           <a:p>
-            <a:endParaRPr lang="en-US" altLang="ko-KR"/>
+            <a:endParaRPr lang="en-US" altLang="ko-KR" dirty="0"/>
           </a:p>
         </p:txBody>
       </p:sp>
@@ -9895,13 +9866,6 @@
               </a:rPr>
               <a:t>라는 특수한</a:t>
             </a:r>
-            <a:r>
-              <a:rPr lang="en-US" altLang="ko-KR" sz="2400">
-                <a:latin typeface="G마켓 산스 TTF Medium" panose="02000000000000000000" pitchFamily="2" charset="-127"/>
-                <a:ea typeface="G마켓 산스 TTF Medium" panose="02000000000000000000" pitchFamily="2" charset="-127"/>
-              </a:rPr>
-              <a:t/>
-            </a:r>
             <a:br>
               <a:rPr lang="en-US" altLang="ko-KR" sz="2400">
                 <a:latin typeface="G마켓 산스 TTF Medium" panose="02000000000000000000" pitchFamily="2" charset="-127"/>
@@ -10726,13 +10690,6 @@
               </a:rPr>
               <a:t>브랜치를 생성하고 푸쉬하게 되면</a:t>
             </a:r>
-            <a:r>
-              <a:rPr lang="en-US" altLang="ko-KR" sz="2000">
-                <a:latin typeface="G마켓 산스 TTF Medium" panose="02000000000000000000" pitchFamily="2" charset="-127"/>
-                <a:ea typeface="G마켓 산스 TTF Medium" panose="02000000000000000000" pitchFamily="2" charset="-127"/>
-              </a:rPr>
-              <a:t/>
-            </a:r>
             <a:br>
               <a:rPr lang="en-US" altLang="ko-KR" sz="2000">
                 <a:latin typeface="G마켓 산스 TTF Medium" panose="02000000000000000000" pitchFamily="2" charset="-127"/>
@@ -10759,13 +10716,6 @@
                 <a:ea typeface="G마켓 산스 TTF Medium" panose="02000000000000000000" pitchFamily="2" charset="-127"/>
               </a:rPr>
               <a:t>는 최신 커밋을 </a:t>
-            </a:r>
-            <a:r>
-              <a:rPr lang="en-US" altLang="ko-KR" sz="2000">
-                <a:latin typeface="G마켓 산스 TTF Medium" panose="02000000000000000000" pitchFamily="2" charset="-127"/>
-                <a:ea typeface="G마켓 산스 TTF Medium" panose="02000000000000000000" pitchFamily="2" charset="-127"/>
-              </a:rPr>
-              <a:t/>
             </a:r>
             <a:br>
               <a:rPr lang="en-US" altLang="ko-KR" sz="2000">
@@ -10836,13 +10786,6 @@
               </a:rPr>
               <a:t>는 기본</a:t>
             </a:r>
-            <a:r>
-              <a:rPr lang="en-US" altLang="ko-KR" sz="2000" dirty="0">
-                <a:latin typeface="G마켓 산스 TTF Medium" panose="02000000000000000000" pitchFamily="2" charset="-127"/>
-                <a:ea typeface="G마켓 산스 TTF Medium" panose="02000000000000000000" pitchFamily="2" charset="-127"/>
-              </a:rPr>
-              <a:t/>
-            </a:r>
             <a:br>
               <a:rPr lang="en-US" altLang="ko-KR" sz="2000" dirty="0">
                 <a:latin typeface="G마켓 산스 TTF Medium" panose="02000000000000000000" pitchFamily="2" charset="-127"/>
@@ -10922,13 +10865,6 @@
               </a:rPr>
               <a:t> 해서 자동</a:t>
             </a:r>
-            <a:r>
-              <a:rPr lang="en-US" altLang="ko-KR" sz="2000" dirty="0">
-                <a:latin typeface="G마켓 산스 TTF Medium" panose="02000000000000000000" pitchFamily="2" charset="-127"/>
-                <a:ea typeface="G마켓 산스 TTF Medium" panose="02000000000000000000" pitchFamily="2" charset="-127"/>
-              </a:rPr>
-              <a:t/>
-            </a:r>
             <a:br>
               <a:rPr lang="en-US" altLang="ko-KR" sz="2000" dirty="0">
                 <a:latin typeface="G마켓 산스 TTF Medium" panose="02000000000000000000" pitchFamily="2" charset="-127"/>
@@ -10987,13 +10923,6 @@
               </a:rPr>
               <a:t> 원격저장소에 단지</a:t>
             </a:r>
-            <a:r>
-              <a:rPr lang="en-US" altLang="ko-KR" sz="2000" dirty="0">
-                <a:latin typeface="G마켓 산스 TTF Medium" panose="02000000000000000000" pitchFamily="2" charset="-127"/>
-                <a:ea typeface="G마켓 산스 TTF Medium" panose="02000000000000000000" pitchFamily="2" charset="-127"/>
-              </a:rPr>
-              <a:t/>
-            </a:r>
             <a:br>
               <a:rPr lang="en-US" altLang="ko-KR" sz="2000" dirty="0">
                 <a:latin typeface="G마켓 산스 TTF Medium" panose="02000000000000000000" pitchFamily="2" charset="-127"/>
@@ -11027,13 +10956,6 @@
                 <a:ea typeface="G마켓 산스 TTF Medium" panose="02000000000000000000" pitchFamily="2" charset="-127"/>
               </a:rPr>
               <a:t> 영향이 </a:t>
-            </a:r>
-            <a:r>
-              <a:rPr lang="en-US" altLang="ko-KR" sz="2000" dirty="0">
-                <a:latin typeface="G마켓 산스 TTF Medium" panose="02000000000000000000" pitchFamily="2" charset="-127"/>
-                <a:ea typeface="G마켓 산스 TTF Medium" panose="02000000000000000000" pitchFamily="2" charset="-127"/>
-              </a:rPr>
-              <a:t/>
             </a:r>
             <a:br>
               <a:rPr lang="en-US" altLang="ko-KR" sz="2000" dirty="0">
@@ -11078,13 +11000,6 @@
                 <a:ea typeface="G마켓 산스 TTF Medium" panose="02000000000000000000" pitchFamily="2" charset="-127"/>
               </a:rPr>
               <a:t>가 일치되게 하려면 병합</a:t>
-            </a:r>
-            <a:r>
-              <a:rPr lang="en-US" altLang="ko-KR" sz="2000" dirty="0">
-                <a:latin typeface="G마켓 산스 TTF Medium" panose="02000000000000000000" pitchFamily="2" charset="-127"/>
-                <a:ea typeface="G마켓 산스 TTF Medium" panose="02000000000000000000" pitchFamily="2" charset="-127"/>
-              </a:rPr>
-              <a:t/>
             </a:r>
             <a:br>
               <a:rPr lang="en-US" altLang="ko-KR" sz="2000" dirty="0">
@@ -13360,13 +13275,6 @@
                 <a:ea typeface="G마켓 산스 TTF Medium" panose="02000000000000000000" pitchFamily="2" charset="-127"/>
               </a:rPr>
               <a:t>브랜치에서 분기한 브랜치가 기존커밋에 영향이 없는상태에서</a:t>
-            </a:r>
-            <a:r>
-              <a:rPr lang="en-US" altLang="ko-KR" sz="2400">
-                <a:latin typeface="G마켓 산스 TTF Medium" panose="02000000000000000000" pitchFamily="2" charset="-127"/>
-                <a:ea typeface="G마켓 산스 TTF Medium" panose="02000000000000000000" pitchFamily="2" charset="-127"/>
-              </a:rPr>
-              <a:t/>
             </a:r>
             <a:br>
               <a:rPr lang="en-US" altLang="ko-KR" sz="2400">
@@ -17533,13 +17441,6 @@
               </a:rPr>
               <a:t>에 관여하기 </a:t>
             </a:r>
-            <a:r>
-              <a:rPr lang="en-US" altLang="ko-KR" sz="2400">
-                <a:latin typeface="G마켓 산스 TTF Medium" panose="02000000000000000000" pitchFamily="2" charset="-127"/>
-                <a:ea typeface="G마켓 산스 TTF Medium" panose="02000000000000000000" pitchFamily="2" charset="-127"/>
-              </a:rPr>
-              <a:t/>
-            </a:r>
             <a:br>
               <a:rPr lang="en-US" altLang="ko-KR" sz="2400">
                 <a:latin typeface="G마켓 산스 TTF Medium" panose="02000000000000000000" pitchFamily="2" charset="-127"/>
@@ -19877,13 +19778,6 @@
               </a:rPr>
               <a:t>해줄 수 있으니 </a:t>
             </a:r>
-            <a:r>
-              <a:rPr lang="en-US" altLang="ko-KR" sz="2000">
-                <a:latin typeface="G마켓 산스 TTF Light" panose="02000000000000000000" pitchFamily="2" charset="-127"/>
-                <a:ea typeface="G마켓 산스 TTF Light" panose="02000000000000000000" pitchFamily="2" charset="-127"/>
-              </a:rPr>
-              <a:t/>
-            </a:r>
             <a:br>
               <a:rPr lang="en-US" altLang="ko-KR" sz="2000">
                 <a:latin typeface="G마켓 산스 TTF Light" panose="02000000000000000000" pitchFamily="2" charset="-127"/>
@@ -19959,37 +19853,33 @@
           <a:lstStyle/>
           <a:p>
             <a:r>
-              <a:rPr lang="en-US" altLang="ko-KR" sz="2000" dirty="0" smtClean="0">
+              <a:rPr lang="en-US" altLang="ko-KR" sz="2000" dirty="0">
                 <a:latin typeface="G마켓 산스 TTF Light" panose="02000000000000000000" pitchFamily="2" charset="-127"/>
                 <a:ea typeface="G마켓 산스 TTF Light" panose="02000000000000000000" pitchFamily="2" charset="-127"/>
               </a:rPr>
               <a:t>&lt;&lt;&lt; </a:t>
             </a:r>
             <a:r>
-              <a:rPr lang="ko-KR" altLang="en-US" sz="2000" dirty="0" smtClean="0">
+              <a:rPr lang="ko-KR" altLang="en-US" sz="2000" dirty="0">
                 <a:latin typeface="G마켓 산스 TTF Light" panose="02000000000000000000" pitchFamily="2" charset="-127"/>
                 <a:ea typeface="G마켓 산스 TTF Light" panose="02000000000000000000" pitchFamily="2" charset="-127"/>
               </a:rPr>
               <a:t>특정 </a:t>
             </a:r>
             <a:r>
-              <a:rPr lang="en-US" altLang="ko-KR" sz="2000" dirty="0" smtClean="0">
+              <a:rPr lang="en-US" altLang="ko-KR" sz="2000" dirty="0">
                 <a:latin typeface="G마켓 산스 TTF Light" panose="02000000000000000000" pitchFamily="2" charset="-127"/>
                 <a:ea typeface="G마켓 산스 TTF Light" panose="02000000000000000000" pitchFamily="2" charset="-127"/>
               </a:rPr>
               <a:t>Tool </a:t>
             </a:r>
             <a:r>
-              <a:rPr lang="ko-KR" altLang="en-US" sz="2000" dirty="0" smtClean="0">
+              <a:rPr lang="ko-KR" altLang="en-US" sz="2000" dirty="0">
                 <a:latin typeface="G마켓 산스 TTF Light" panose="02000000000000000000" pitchFamily="2" charset="-127"/>
                 <a:ea typeface="G마켓 산스 TTF Light" panose="02000000000000000000" pitchFamily="2" charset="-127"/>
               </a:rPr>
               <a:t>에서 보일 때</a:t>
             </a:r>
-            <a:endParaRPr lang="ko-KR" altLang="en-US" sz="2000" dirty="0">
-              <a:latin typeface="G마켓 산스 TTF Light" panose="02000000000000000000" pitchFamily="2" charset="-127"/>
-              <a:ea typeface="G마켓 산스 TTF Light" panose="02000000000000000000" pitchFamily="2" charset="-127"/>
-            </a:endParaRPr>
           </a:p>
         </p:txBody>
       </p:sp>
@@ -20088,16 +19978,12 @@
           <a:p>
             <a:pPr marL="342900" lvl="1" indent="-342900"/>
             <a:r>
-              <a:rPr lang="ko-KR" altLang="en-US" dirty="0" smtClean="0"/>
+              <a:rPr lang="ko-KR" altLang="en-US" dirty="0"/>
               <a:t>방법</a:t>
             </a:r>
             <a:r>
-              <a:rPr lang="en-US" altLang="ko-KR" dirty="0" smtClean="0"/>
-              <a:t> </a:t>
-            </a:r>
-            <a:r>
               <a:rPr lang="en-US" altLang="ko-KR" dirty="0"/>
-              <a:t>: </a:t>
+              <a:t> : </a:t>
             </a:r>
             <a:r>
               <a:rPr lang="ko-KR" altLang="en-US" dirty="0"/>
@@ -20984,13 +20870,11 @@
           <p:cNvGraphicFramePr>
             <a:graphicFrameLocks noGrp="1"/>
           </p:cNvGraphicFramePr>
-          <p:nvPr>
-            <p:extLst/>
-          </p:nvPr>
+          <p:nvPr/>
         </p:nvGraphicFramePr>
         <p:xfrm>
           <a:off x="1267916" y="2902476"/>
-          <a:ext cx="9656167" cy="2011680"/>
+          <a:ext cx="9656167" cy="1836616"/>
         </p:xfrm>
         <a:graphic>
           <a:graphicData uri="http://schemas.openxmlformats.org/drawingml/2006/table">
@@ -21880,7 +21764,7 @@
           <a:p>
             <a:pPr algn="ctr"/>
             <a:r>
-              <a:rPr lang="en-US" altLang="ko-KR" sz="6600" dirty="0" smtClean="0">
+              <a:rPr lang="en-US" altLang="ko-KR" sz="6600" dirty="0">
                 <a:latin typeface="G마켓 산스 TTF Bold" panose="02000000000000000000" pitchFamily="2" charset="-127"/>
                 <a:ea typeface="G마켓 산스 TTF Bold" panose="02000000000000000000" pitchFamily="2" charset="-127"/>
               </a:rPr>
@@ -23542,7 +23426,7 @@
           <a:p>
             <a:pPr algn="ctr"/>
             <a:r>
-              <a:rPr lang="ko-KR" altLang="en-US" sz="1400" b="1" dirty="0" smtClean="0">
+              <a:rPr lang="ko-KR" altLang="en-US" sz="1400" b="1" dirty="0">
                 <a:solidFill>
                   <a:schemeClr val="bg1"/>
                 </a:solidFill>
@@ -23551,27 +23435,17 @@
               </a:rPr>
               <a:t>병합</a:t>
             </a:r>
-            <a:r>
-              <a:rPr lang="en-US" altLang="ko-KR" sz="1400" b="1" dirty="0" smtClean="0">
+            <a:br>
+              <a:rPr lang="en-US" altLang="ko-KR" sz="1400" b="1" dirty="0">
                 <a:solidFill>
                   <a:schemeClr val="bg1"/>
                 </a:solidFill>
                 <a:latin typeface="G마켓 산스 TTF Light" panose="02000000000000000000" pitchFamily="2" charset="-127"/>
                 <a:ea typeface="G마켓 산스 TTF Light" panose="02000000000000000000" pitchFamily="2" charset="-127"/>
               </a:rPr>
-              <a:t/>
-            </a:r>
-            <a:br>
-              <a:rPr lang="en-US" altLang="ko-KR" sz="1400" b="1" dirty="0" smtClean="0">
-                <a:solidFill>
-                  <a:schemeClr val="bg1"/>
-                </a:solidFill>
-                <a:latin typeface="G마켓 산스 TTF Light" panose="02000000000000000000" pitchFamily="2" charset="-127"/>
-                <a:ea typeface="G마켓 산스 TTF Light" panose="02000000000000000000" pitchFamily="2" charset="-127"/>
-              </a:rPr>
             </a:br>
             <a:r>
-              <a:rPr lang="ko-KR" altLang="en-US" sz="1400" b="1" dirty="0" err="1" smtClean="0">
+              <a:rPr lang="ko-KR" altLang="en-US" sz="1400" b="1" dirty="0" err="1">
                 <a:solidFill>
                   <a:schemeClr val="bg1"/>
                 </a:solidFill>
@@ -23690,13 +23564,6 @@
                 <a:ea typeface="G마켓 산스 TTF Medium" panose="02000000000000000000" pitchFamily="2" charset="-127"/>
               </a:rPr>
               <a:t>이동 명령어 예시</a:t>
-            </a:r>
-            <a:r>
-              <a:rPr lang="en-US" altLang="ko-KR" sz="2000" dirty="0">
-                <a:latin typeface="G마켓 산스 TTF Medium" panose="02000000000000000000" pitchFamily="2" charset="-127"/>
-                <a:ea typeface="G마켓 산스 TTF Medium" panose="02000000000000000000" pitchFamily="2" charset="-127"/>
-              </a:rPr>
-              <a:t/>
             </a:r>
             <a:br>
               <a:rPr lang="en-US" altLang="ko-KR" sz="2000" dirty="0">
@@ -25834,21 +25701,7 @@
                 <a:latin typeface="G마켓 산스 TTF Medium" panose="02000000000000000000" pitchFamily="2" charset="-127"/>
                 <a:ea typeface="G마켓 산스 TTF Medium" panose="02000000000000000000" pitchFamily="2" charset="-127"/>
               </a:rPr>
-              <a:t>이 잘못되어 </a:t>
-            </a:r>
-            <a:r>
-              <a:rPr lang="ko-KR" altLang="en-US" sz="2000" dirty="0" smtClean="0">
-                <a:latin typeface="G마켓 산스 TTF Medium" panose="02000000000000000000" pitchFamily="2" charset="-127"/>
-                <a:ea typeface="G마켓 산스 TTF Medium" panose="02000000000000000000" pitchFamily="2" charset="-127"/>
-              </a:rPr>
-              <a:t>되돌린다면</a:t>
-            </a:r>
-            <a:r>
-              <a:rPr lang="en-US" altLang="ko-KR" sz="2000" dirty="0">
-                <a:latin typeface="G마켓 산스 TTF Medium" panose="02000000000000000000" pitchFamily="2" charset="-127"/>
-                <a:ea typeface="G마켓 산스 TTF Medium" panose="02000000000000000000" pitchFamily="2" charset="-127"/>
-              </a:rPr>
-              <a:t/>
+              <a:t>이 잘못되어 되돌린다면</a:t>
             </a:r>
             <a:br>
               <a:rPr lang="en-US" altLang="ko-KR" sz="2000" dirty="0">
@@ -28288,14 +28141,10 @@
             </a:r>
             <a:r>
               <a:rPr lang="ko-KR" altLang="en-US" dirty="0"/>
-              <a:t> </a:t>
-            </a:r>
-            <a:r>
-              <a:rPr lang="ko-KR" altLang="en-US" dirty="0" smtClean="0"/>
-              <a:t>저장소에서 </a:t>
-            </a:r>
-            <a:r>
-              <a:rPr lang="ko-KR" altLang="en-US" b="1" dirty="0" smtClean="0">
+              <a:t> 저장소에서 </a:t>
+            </a:r>
+            <a:r>
+              <a:rPr lang="ko-KR" altLang="en-US" b="1" dirty="0">
                 <a:solidFill>
                   <a:srgbClr val="FF0000"/>
                 </a:solidFill>
@@ -28303,47 +28152,47 @@
               <a:t>하나의 독립적인 작업 공간</a:t>
             </a:r>
             <a:r>
-              <a:rPr lang="ko-KR" altLang="en-US" dirty="0" smtClean="0"/>
+              <a:rPr lang="ko-KR" altLang="en-US" dirty="0"/>
               <a:t>을 뜻함</a:t>
             </a:r>
-            <a:endParaRPr lang="en-US" altLang="ko-KR" dirty="0" smtClean="0"/>
+            <a:endParaRPr lang="en-US" altLang="ko-KR" dirty="0"/>
           </a:p>
           <a:p>
             <a:pPr marL="914400" lvl="2" indent="-457200"/>
             <a:r>
-              <a:rPr lang="ko-KR" altLang="en-US" dirty="0" smtClean="0"/>
+              <a:rPr lang="ko-KR" altLang="en-US" dirty="0"/>
               <a:t>우리는 지금까지 </a:t>
             </a:r>
             <a:r>
-              <a:rPr lang="en-US" altLang="ko-KR" dirty="0" smtClean="0"/>
+              <a:rPr lang="en-US" altLang="ko-KR" dirty="0"/>
               <a:t>main</a:t>
             </a:r>
             <a:r>
-              <a:rPr lang="ko-KR" altLang="en-US" dirty="0" smtClean="0"/>
+              <a:rPr lang="ko-KR" altLang="en-US" dirty="0"/>
               <a:t>만 사용함</a:t>
             </a:r>
-            <a:endParaRPr lang="en-US" altLang="ko-KR" dirty="0" smtClean="0"/>
+            <a:endParaRPr lang="en-US" altLang="ko-KR" dirty="0"/>
           </a:p>
           <a:p>
             <a:pPr marL="457200" lvl="1" indent="-457200"/>
             <a:r>
-              <a:rPr lang="ko-KR" altLang="en-US" dirty="0" smtClean="0"/>
+              <a:rPr lang="ko-KR" altLang="en-US" dirty="0"/>
               <a:t>작업 진행하면서 여러가지의 </a:t>
             </a:r>
             <a:r>
-              <a:rPr lang="ko-KR" altLang="en-US" dirty="0" err="1" smtClean="0"/>
+              <a:rPr lang="ko-KR" altLang="en-US" dirty="0" err="1"/>
               <a:t>브랜치를</a:t>
             </a:r>
             <a:r>
-              <a:rPr lang="ko-KR" altLang="en-US" dirty="0" smtClean="0"/>
+              <a:rPr lang="ko-KR" altLang="en-US" dirty="0"/>
               <a:t> 생성 할 수 있음</a:t>
             </a:r>
-            <a:endParaRPr lang="en-US" altLang="ko-KR" dirty="0" smtClean="0"/>
+            <a:endParaRPr lang="en-US" altLang="ko-KR" dirty="0"/>
           </a:p>
           <a:p>
             <a:pPr marL="457200" lvl="1" indent="-457200"/>
             <a:r>
-              <a:rPr lang="ko-KR" altLang="en-US" dirty="0" smtClean="0"/>
+              <a:rPr lang="ko-KR" altLang="en-US" dirty="0"/>
               <a:t>앞으로 </a:t>
             </a:r>
             <a:r>
@@ -28818,13 +28667,6 @@
               </a:rPr>
               <a:t>브랜치는 나뭇가지의 뜻으로 하나의 나무에 여러 나뭇가지가 새 줄기를 생성하여 </a:t>
             </a:r>
-            <a:r>
-              <a:rPr lang="en-US" altLang="ko-KR" sz="2400">
-                <a:latin typeface="G마켓 산스 TTF Medium" panose="02000000000000000000" pitchFamily="2" charset="-127"/>
-                <a:ea typeface="G마켓 산스 TTF Medium" panose="02000000000000000000" pitchFamily="2" charset="-127"/>
-              </a:rPr>
-              <a:t/>
-            </a:r>
             <a:br>
               <a:rPr lang="en-US" altLang="ko-KR" sz="2400">
                 <a:latin typeface="G마켓 산스 TTF Medium" panose="02000000000000000000" pitchFamily="2" charset="-127"/>
@@ -29463,22 +29305,21 @@
           <a:lstStyle/>
           <a:p>
             <a:r>
-              <a:rPr lang="ko-KR" altLang="en-US" sz="4800" dirty="0" err="1" smtClean="0"/>
+              <a:rPr lang="ko-KR" altLang="en-US" sz="4800" dirty="0" err="1"/>
               <a:t>브랜치</a:t>
             </a:r>
             <a:r>
-              <a:rPr lang="ko-KR" altLang="en-US" sz="4800" dirty="0" smtClean="0"/>
+              <a:rPr lang="ko-KR" altLang="en-US" sz="4800" dirty="0"/>
               <a:t> 이해하기 </a:t>
             </a:r>
             <a:r>
-              <a:rPr lang="en-US" altLang="ko-KR" sz="4800" dirty="0" smtClean="0"/>
+              <a:rPr lang="en-US" altLang="ko-KR" sz="4800" dirty="0"/>
               <a:t>- </a:t>
             </a:r>
             <a:r>
-              <a:rPr lang="ko-KR" altLang="en-US" sz="4800" dirty="0" smtClean="0"/>
+              <a:rPr lang="ko-KR" altLang="en-US" sz="4800" dirty="0"/>
               <a:t>명령어</a:t>
             </a:r>
-            <a:endParaRPr lang="ko-KR" altLang="en-US" sz="4800" dirty="0"/>
           </a:p>
         </p:txBody>
       </p:sp>
@@ -29758,11 +29599,7 @@
             </a:r>
             <a:r>
               <a:rPr lang="en-US" altLang="ko-KR" sz="2000" dirty="0"/>
-              <a:t> checkout –b </a:t>
-            </a:r>
-            <a:r>
-              <a:rPr lang="en-US" altLang="ko-KR" sz="2000" dirty="0" smtClean="0"/>
-              <a:t>test</a:t>
+              <a:t> checkout –b test</a:t>
             </a:r>
           </a:p>
           <a:p>
@@ -29916,13 +29753,6 @@
   <p:clrMapOvr>
     <a:masterClrMapping/>
   </p:clrMapOvr>
-  <p:timing>
-    <p:tnLst>
-      <p:par>
-        <p:cTn id="1" dur="indefinite" restart="never" nodeType="tmRoot"/>
-      </p:par>
-    </p:tnLst>
-  </p:timing>
 </p:sld>
 </file>
 
@@ -29972,22 +29802,21 @@
           <a:lstStyle/>
           <a:p>
             <a:r>
-              <a:rPr lang="ko-KR" altLang="en-US" sz="4800" dirty="0" err="1" smtClean="0"/>
+              <a:rPr lang="ko-KR" altLang="en-US" sz="4800" dirty="0" err="1"/>
               <a:t>브랜치</a:t>
             </a:r>
             <a:r>
-              <a:rPr lang="ko-KR" altLang="en-US" sz="4800" dirty="0" smtClean="0"/>
+              <a:rPr lang="ko-KR" altLang="en-US" sz="4800" dirty="0"/>
               <a:t> 이해하기 </a:t>
             </a:r>
             <a:r>
-              <a:rPr lang="en-US" altLang="ko-KR" sz="4800" dirty="0" smtClean="0"/>
+              <a:rPr lang="en-US" altLang="ko-KR" sz="4800" dirty="0"/>
               <a:t>- </a:t>
             </a:r>
             <a:r>
-              <a:rPr lang="ko-KR" altLang="en-US" sz="4800" dirty="0" smtClean="0"/>
+              <a:rPr lang="ko-KR" altLang="en-US" sz="4800" dirty="0"/>
               <a:t>명령어</a:t>
             </a:r>
-            <a:endParaRPr lang="ko-KR" altLang="en-US" sz="4800" dirty="0"/>
           </a:p>
         </p:txBody>
       </p:sp>
@@ -30251,15 +30080,15 @@
               </a:lnSpc>
             </a:pPr>
             <a:r>
-              <a:rPr lang="en-US" altLang="ko-KR" sz="2000" dirty="0" smtClean="0"/>
+              <a:rPr lang="en-US" altLang="ko-KR" sz="2000" dirty="0"/>
               <a:t>ex) </a:t>
             </a:r>
             <a:r>
-              <a:rPr lang="en-US" altLang="ko-KR" sz="2000" dirty="0" err="1" smtClean="0"/>
+              <a:rPr lang="en-US" altLang="ko-KR" sz="2000" dirty="0" err="1"/>
               <a:t>git</a:t>
             </a:r>
             <a:r>
-              <a:rPr lang="en-US" altLang="ko-KR" sz="2000" dirty="0" smtClean="0"/>
+              <a:rPr lang="en-US" altLang="ko-KR" sz="2000" dirty="0"/>
               <a:t> push origin –d test</a:t>
             </a:r>
           </a:p>
@@ -30313,13 +30142,6 @@
   <p:clrMapOvr>
     <a:masterClrMapping/>
   </p:clrMapOvr>
-  <p:timing>
-    <p:tnLst>
-      <p:par>
-        <p:cTn id="1" dur="indefinite" restart="never" nodeType="tmRoot"/>
-      </p:par>
-    </p:tnLst>
-  </p:timing>
 </p:sld>
 </file>
 

</xml_diff>